<commit_message>
- fix pptx - add screen shot
</commit_message>
<xml_diff>
--- a/docs/temput.pptx
+++ b/docs/temput.pptx
@@ -4175,7 +4175,7 @@
                   <a:latin typeface="x12y12pxMaruMinya" panose="02000503000000000000" pitchFamily="2" charset="-128"/>
                   <a:ea typeface="x12y12pxMaruMinya" panose="02000503000000000000" pitchFamily="2" charset="-128"/>
                 </a:rPr>
-                <a:t>テンプレート文字列を書き込めます</a:t>
+                <a:t>テンプレート文字をコピーできます</a:t>
               </a:r>
               <a:endParaRPr kumimoji="1" lang="en-US" altLang="ja-JP" sz="3600" dirty="0">
                 <a:latin typeface="x12y12pxMaruMinya" panose="02000503000000000000" pitchFamily="2" charset="-128"/>
@@ -4189,7 +4189,7 @@
                   <a:latin typeface="x12y12pxMaruMinya" panose="02000503000000000000" pitchFamily="2" charset="-128"/>
                   <a:ea typeface="x12y12pxMaruMinya" panose="02000503000000000000" pitchFamily="2" charset="-128"/>
                 </a:rPr>
-                <a:t>Enter template text</a:t>
+                <a:t>Copy template text</a:t>
               </a:r>
               <a:endParaRPr kumimoji="1" lang="ja-JP" altLang="en-US" sz="3600">
                 <a:latin typeface="x12y12pxMaruMinya" panose="02000503000000000000" pitchFamily="2" charset="-128"/>

</xml_diff>